<commit_message>
Testing the github works with changes in the powerpoint
</commit_message>
<xml_diff>
--- a/Presentasjonsområde.pptx
+++ b/Presentasjonsområde.pptx
@@ -107,11 +107,40 @@
       </a:defRPr>
     </a:lvl9pPr>
   </p:defaultTextStyle>
+  <p:extLst>
+    <p:ext uri="{EFAFB233-063F-42B5-8137-9DF3F51BA10A}">
+      <p15:sldGuideLst xmlns:p15="http://schemas.microsoft.com/office/powerpoint/2012/main"/>
+    </p:ext>
+  </p:extLst>
 </p:presentation>
 </file>
 
 <file path=ppt/changesInfos/changesInfo1.xml><?xml version="1.0" encoding="utf-8"?>
 <pc:chgInfo xmlns:a="http://schemas.openxmlformats.org/drawingml/2006/main" xmlns:r="http://schemas.openxmlformats.org/officeDocument/2006/relationships" xmlns:ac="http://schemas.microsoft.com/office/drawing/2013/main/command" xmlns:pc="http://schemas.microsoft.com/office/powerpoint/2013/main/command">
+  <pc:docChgLst>
+    <pc:chgData name="Hai Duc Pham" userId="e41707fd6606424b" providerId="LiveId" clId="{6FF13D4A-5A3E-4499-ABF4-81535BB5C73A}"/>
+    <pc:docChg chg="modSld">
+      <pc:chgData name="Hai Duc Pham" userId="e41707fd6606424b" providerId="LiveId" clId="{6FF13D4A-5A3E-4499-ABF4-81535BB5C73A}" dt="2024-11-05T13:51:29.080" v="4" actId="20577"/>
+      <pc:docMkLst>
+        <pc:docMk/>
+      </pc:docMkLst>
+      <pc:sldChg chg="modSp mod">
+        <pc:chgData name="Hai Duc Pham" userId="e41707fd6606424b" providerId="LiveId" clId="{6FF13D4A-5A3E-4499-ABF4-81535BB5C73A}" dt="2024-11-05T13:51:29.080" v="4" actId="20577"/>
+        <pc:sldMkLst>
+          <pc:docMk/>
+          <pc:sldMk cId="147735356" sldId="257"/>
+        </pc:sldMkLst>
+        <pc:spChg chg="mod">
+          <ac:chgData name="Hai Duc Pham" userId="e41707fd6606424b" providerId="LiveId" clId="{6FF13D4A-5A3E-4499-ABF4-81535BB5C73A}" dt="2024-11-05T13:51:29.080" v="4" actId="20577"/>
+          <ac:spMkLst>
+            <pc:docMk/>
+            <pc:sldMk cId="147735356" sldId="257"/>
+            <ac:spMk id="2" creationId="{7B1F8CD5-A716-224E-E310-B5858BD0B1B2}"/>
+          </ac:spMkLst>
+        </pc:spChg>
+      </pc:sldChg>
+    </pc:docChg>
+  </pc:docChgLst>
   <pc:docChgLst>
     <pc:chgData name="Hai Duc Pham" userId="e41707fd6606424b" providerId="LiveId" clId="{D71575DF-74BE-4E61-BDD2-B727AF610E15}"/>
     <pc:docChg chg="custSel addSld modSld">
@@ -5548,7 +5577,10 @@
           <a:bodyPr/>
           <a:lstStyle/>
           <a:p>
-            <a:endParaRPr lang="nb-NO"/>
+            <a:r>
+              <a:rPr lang="nb-NO"/>
+              <a:t>Hallo</a:t>
+            </a:r>
           </a:p>
         </p:txBody>
       </p:sp>

</xml_diff>